<commit_message>
alterações desenho de arquitetura
</commit_message>
<xml_diff>
--- a/Desenho de Arquitetura.pptx
+++ b/Desenho de Arquitetura.pptx
@@ -259,7 +259,7 @@
           <a:p>
             <a:fld id="{A6855F6E-E23F-4401-B6B0-C27E3B10C9A1}" type="datetimeFigureOut">
               <a:rPr lang="pt-BR" smtClean="0"/>
-              <a:t>16/04/2022</a:t>
+              <a:t>21/04/2022</a:t>
             </a:fld>
             <a:endParaRPr lang="pt-BR"/>
           </a:p>
@@ -313,7 +313,7 @@
           <a:p>
             <a:fld id="{64C426D7-35A4-4F90-89F2-190644AC5077}" type="slidenum">
               <a:rPr lang="pt-BR" smtClean="0"/>
-              <a:t>‹nº›</a:t>
+              <a:t>‹#›</a:t>
             </a:fld>
             <a:endParaRPr lang="pt-BR"/>
           </a:p>
@@ -457,7 +457,7 @@
           <a:p>
             <a:fld id="{A6855F6E-E23F-4401-B6B0-C27E3B10C9A1}" type="datetimeFigureOut">
               <a:rPr lang="pt-BR" smtClean="0"/>
-              <a:t>16/04/2022</a:t>
+              <a:t>21/04/2022</a:t>
             </a:fld>
             <a:endParaRPr lang="pt-BR"/>
           </a:p>
@@ -511,7 +511,7 @@
           <a:p>
             <a:fld id="{64C426D7-35A4-4F90-89F2-190644AC5077}" type="slidenum">
               <a:rPr lang="pt-BR" smtClean="0"/>
-              <a:t>‹nº›</a:t>
+              <a:t>‹#›</a:t>
             </a:fld>
             <a:endParaRPr lang="pt-BR"/>
           </a:p>
@@ -665,7 +665,7 @@
           <a:p>
             <a:fld id="{A6855F6E-E23F-4401-B6B0-C27E3B10C9A1}" type="datetimeFigureOut">
               <a:rPr lang="pt-BR" smtClean="0"/>
-              <a:t>16/04/2022</a:t>
+              <a:t>21/04/2022</a:t>
             </a:fld>
             <a:endParaRPr lang="pt-BR"/>
           </a:p>
@@ -719,7 +719,7 @@
           <a:p>
             <a:fld id="{64C426D7-35A4-4F90-89F2-190644AC5077}" type="slidenum">
               <a:rPr lang="pt-BR" smtClean="0"/>
-              <a:t>‹nº›</a:t>
+              <a:t>‹#›</a:t>
             </a:fld>
             <a:endParaRPr lang="pt-BR"/>
           </a:p>
@@ -863,7 +863,7 @@
           <a:p>
             <a:fld id="{A6855F6E-E23F-4401-B6B0-C27E3B10C9A1}" type="datetimeFigureOut">
               <a:rPr lang="pt-BR" smtClean="0"/>
-              <a:t>16/04/2022</a:t>
+              <a:t>21/04/2022</a:t>
             </a:fld>
             <a:endParaRPr lang="pt-BR"/>
           </a:p>
@@ -917,7 +917,7 @@
           <a:p>
             <a:fld id="{64C426D7-35A4-4F90-89F2-190644AC5077}" type="slidenum">
               <a:rPr lang="pt-BR" smtClean="0"/>
-              <a:t>‹nº›</a:t>
+              <a:t>‹#›</a:t>
             </a:fld>
             <a:endParaRPr lang="pt-BR"/>
           </a:p>
@@ -1138,7 +1138,7 @@
           <a:p>
             <a:fld id="{A6855F6E-E23F-4401-B6B0-C27E3B10C9A1}" type="datetimeFigureOut">
               <a:rPr lang="pt-BR" smtClean="0"/>
-              <a:t>16/04/2022</a:t>
+              <a:t>21/04/2022</a:t>
             </a:fld>
             <a:endParaRPr lang="pt-BR"/>
           </a:p>
@@ -1192,7 +1192,7 @@
           <a:p>
             <a:fld id="{64C426D7-35A4-4F90-89F2-190644AC5077}" type="slidenum">
               <a:rPr lang="pt-BR" smtClean="0"/>
-              <a:t>‹nº›</a:t>
+              <a:t>‹#›</a:t>
             </a:fld>
             <a:endParaRPr lang="pt-BR"/>
           </a:p>
@@ -1403,7 +1403,7 @@
           <a:p>
             <a:fld id="{A6855F6E-E23F-4401-B6B0-C27E3B10C9A1}" type="datetimeFigureOut">
               <a:rPr lang="pt-BR" smtClean="0"/>
-              <a:t>16/04/2022</a:t>
+              <a:t>21/04/2022</a:t>
             </a:fld>
             <a:endParaRPr lang="pt-BR"/>
           </a:p>
@@ -1457,7 +1457,7 @@
           <a:p>
             <a:fld id="{64C426D7-35A4-4F90-89F2-190644AC5077}" type="slidenum">
               <a:rPr lang="pt-BR" smtClean="0"/>
-              <a:t>‹nº›</a:t>
+              <a:t>‹#›</a:t>
             </a:fld>
             <a:endParaRPr lang="pt-BR"/>
           </a:p>
@@ -1815,7 +1815,7 @@
           <a:p>
             <a:fld id="{A6855F6E-E23F-4401-B6B0-C27E3B10C9A1}" type="datetimeFigureOut">
               <a:rPr lang="pt-BR" smtClean="0"/>
-              <a:t>16/04/2022</a:t>
+              <a:t>21/04/2022</a:t>
             </a:fld>
             <a:endParaRPr lang="pt-BR"/>
           </a:p>
@@ -1869,7 +1869,7 @@
           <a:p>
             <a:fld id="{64C426D7-35A4-4F90-89F2-190644AC5077}" type="slidenum">
               <a:rPr lang="pt-BR" smtClean="0"/>
-              <a:t>‹nº›</a:t>
+              <a:t>‹#›</a:t>
             </a:fld>
             <a:endParaRPr lang="pt-BR"/>
           </a:p>
@@ -1956,7 +1956,7 @@
           <a:p>
             <a:fld id="{A6855F6E-E23F-4401-B6B0-C27E3B10C9A1}" type="datetimeFigureOut">
               <a:rPr lang="pt-BR" smtClean="0"/>
-              <a:t>16/04/2022</a:t>
+              <a:t>21/04/2022</a:t>
             </a:fld>
             <a:endParaRPr lang="pt-BR"/>
           </a:p>
@@ -2010,7 +2010,7 @@
           <a:p>
             <a:fld id="{64C426D7-35A4-4F90-89F2-190644AC5077}" type="slidenum">
               <a:rPr lang="pt-BR" smtClean="0"/>
-              <a:t>‹nº›</a:t>
+              <a:t>‹#›</a:t>
             </a:fld>
             <a:endParaRPr lang="pt-BR"/>
           </a:p>
@@ -2069,7 +2069,7 @@
           <a:p>
             <a:fld id="{A6855F6E-E23F-4401-B6B0-C27E3B10C9A1}" type="datetimeFigureOut">
               <a:rPr lang="pt-BR" smtClean="0"/>
-              <a:t>16/04/2022</a:t>
+              <a:t>21/04/2022</a:t>
             </a:fld>
             <a:endParaRPr lang="pt-BR"/>
           </a:p>
@@ -2123,7 +2123,7 @@
           <a:p>
             <a:fld id="{64C426D7-35A4-4F90-89F2-190644AC5077}" type="slidenum">
               <a:rPr lang="pt-BR" smtClean="0"/>
-              <a:t>‹nº›</a:t>
+              <a:t>‹#›</a:t>
             </a:fld>
             <a:endParaRPr lang="pt-BR"/>
           </a:p>
@@ -2380,7 +2380,7 @@
           <a:p>
             <a:fld id="{A6855F6E-E23F-4401-B6B0-C27E3B10C9A1}" type="datetimeFigureOut">
               <a:rPr lang="pt-BR" smtClean="0"/>
-              <a:t>16/04/2022</a:t>
+              <a:t>21/04/2022</a:t>
             </a:fld>
             <a:endParaRPr lang="pt-BR"/>
           </a:p>
@@ -2434,7 +2434,7 @@
           <a:p>
             <a:fld id="{64C426D7-35A4-4F90-89F2-190644AC5077}" type="slidenum">
               <a:rPr lang="pt-BR" smtClean="0"/>
-              <a:t>‹nº›</a:t>
+              <a:t>‹#›</a:t>
             </a:fld>
             <a:endParaRPr lang="pt-BR"/>
           </a:p>
@@ -2668,7 +2668,7 @@
           <a:p>
             <a:fld id="{A6855F6E-E23F-4401-B6B0-C27E3B10C9A1}" type="datetimeFigureOut">
               <a:rPr lang="pt-BR" smtClean="0"/>
-              <a:t>16/04/2022</a:t>
+              <a:t>21/04/2022</a:t>
             </a:fld>
             <a:endParaRPr lang="pt-BR"/>
           </a:p>
@@ -2722,7 +2722,7 @@
           <a:p>
             <a:fld id="{64C426D7-35A4-4F90-89F2-190644AC5077}" type="slidenum">
               <a:rPr lang="pt-BR" smtClean="0"/>
-              <a:t>‹nº›</a:t>
+              <a:t>‹#›</a:t>
             </a:fld>
             <a:endParaRPr lang="pt-BR"/>
           </a:p>
@@ -2909,7 +2909,7 @@
           <a:p>
             <a:fld id="{A6855F6E-E23F-4401-B6B0-C27E3B10C9A1}" type="datetimeFigureOut">
               <a:rPr lang="pt-BR" smtClean="0"/>
-              <a:t>16/04/2022</a:t>
+              <a:t>21/04/2022</a:t>
             </a:fld>
             <a:endParaRPr lang="pt-BR"/>
           </a:p>
@@ -2999,7 +2999,7 @@
           <a:p>
             <a:fld id="{64C426D7-35A4-4F90-89F2-190644AC5077}" type="slidenum">
               <a:rPr lang="pt-BR" smtClean="0"/>
-              <a:t>‹nº›</a:t>
+              <a:t>‹#›</a:t>
             </a:fld>
             <a:endParaRPr lang="pt-BR"/>
           </a:p>
@@ -3351,7 +3351,7 @@
           </a:solidFill>
           <a:ln w="28575">
             <a:solidFill>
-              <a:srgbClr val="FFC000"/>
+              <a:srgbClr val="00B0F0"/>
             </a:solidFill>
           </a:ln>
         </p:spPr>
@@ -3447,7 +3447,7 @@
           </a:solidFill>
           <a:ln w="28575">
             <a:solidFill>
-              <a:srgbClr val="FFC000"/>
+              <a:srgbClr val="00B0F0"/>
             </a:solidFill>
           </a:ln>
         </p:spPr>
@@ -3843,7 +3843,10 @@
           </a:prstGeom>
           <a:ln w="38100">
             <a:solidFill>
-              <a:srgbClr val="FFC000"/>
+              <a:schemeClr val="tx1">
+                <a:lumMod val="50000"/>
+                <a:lumOff val="50000"/>
+              </a:schemeClr>
             </a:solidFill>
             <a:prstDash val="sysDash"/>
             <a:tailEnd type="triangle"/>
@@ -3888,7 +3891,10 @@
           </a:prstGeom>
           <a:ln w="38100">
             <a:solidFill>
-              <a:srgbClr val="FFC000"/>
+              <a:schemeClr val="tx1">
+                <a:lumMod val="50000"/>
+                <a:lumOff val="50000"/>
+              </a:schemeClr>
             </a:solidFill>
             <a:prstDash val="sysDash"/>
             <a:tailEnd type="triangle"/>
@@ -3935,7 +3941,10 @@
           </a:prstGeom>
           <a:ln w="38100">
             <a:solidFill>
-              <a:srgbClr val="FFC000"/>
+              <a:schemeClr val="tx1">
+                <a:lumMod val="50000"/>
+                <a:lumOff val="50000"/>
+              </a:schemeClr>
             </a:solidFill>
             <a:prstDash val="sysDash"/>
             <a:tailEnd type="triangle"/>
@@ -3982,7 +3991,10 @@
           </a:prstGeom>
           <a:ln w="38100">
             <a:solidFill>
-              <a:srgbClr val="FFC000"/>
+              <a:schemeClr val="tx1">
+                <a:lumMod val="50000"/>
+                <a:lumOff val="50000"/>
+              </a:schemeClr>
             </a:solidFill>
             <a:prstDash val="sysDash"/>
             <a:tailEnd type="triangle"/>
@@ -4028,7 +4040,10 @@
           </a:prstGeom>
           <a:ln w="38100">
             <a:solidFill>
-              <a:srgbClr val="FFC000"/>
+              <a:schemeClr val="tx1">
+                <a:lumMod val="50000"/>
+                <a:lumOff val="50000"/>
+              </a:schemeClr>
             </a:solidFill>
             <a:prstDash val="sysDash"/>
             <a:tailEnd type="triangle"/>

</xml_diff>

<commit_message>
Desenho de arquitetura atualizado
</commit_message>
<xml_diff>
--- a/Desenho de Arquitetura.pptx
+++ b/Desenho de Arquitetura.pptx
@@ -259,7 +259,7 @@
           <a:p>
             <a:fld id="{A6855F6E-E23F-4401-B6B0-C27E3B10C9A1}" type="datetimeFigureOut">
               <a:rPr lang="pt-BR" smtClean="0"/>
-              <a:t>21/04/2022</a:t>
+              <a:t>23/04/2022</a:t>
             </a:fld>
             <a:endParaRPr lang="pt-BR"/>
           </a:p>
@@ -313,7 +313,7 @@
           <a:p>
             <a:fld id="{64C426D7-35A4-4F90-89F2-190644AC5077}" type="slidenum">
               <a:rPr lang="pt-BR" smtClean="0"/>
-              <a:t>‹#›</a:t>
+              <a:t>‹nº›</a:t>
             </a:fld>
             <a:endParaRPr lang="pt-BR"/>
           </a:p>
@@ -457,7 +457,7 @@
           <a:p>
             <a:fld id="{A6855F6E-E23F-4401-B6B0-C27E3B10C9A1}" type="datetimeFigureOut">
               <a:rPr lang="pt-BR" smtClean="0"/>
-              <a:t>21/04/2022</a:t>
+              <a:t>23/04/2022</a:t>
             </a:fld>
             <a:endParaRPr lang="pt-BR"/>
           </a:p>
@@ -511,7 +511,7 @@
           <a:p>
             <a:fld id="{64C426D7-35A4-4F90-89F2-190644AC5077}" type="slidenum">
               <a:rPr lang="pt-BR" smtClean="0"/>
-              <a:t>‹#›</a:t>
+              <a:t>‹nº›</a:t>
             </a:fld>
             <a:endParaRPr lang="pt-BR"/>
           </a:p>
@@ -665,7 +665,7 @@
           <a:p>
             <a:fld id="{A6855F6E-E23F-4401-B6B0-C27E3B10C9A1}" type="datetimeFigureOut">
               <a:rPr lang="pt-BR" smtClean="0"/>
-              <a:t>21/04/2022</a:t>
+              <a:t>23/04/2022</a:t>
             </a:fld>
             <a:endParaRPr lang="pt-BR"/>
           </a:p>
@@ -719,7 +719,7 @@
           <a:p>
             <a:fld id="{64C426D7-35A4-4F90-89F2-190644AC5077}" type="slidenum">
               <a:rPr lang="pt-BR" smtClean="0"/>
-              <a:t>‹#›</a:t>
+              <a:t>‹nº›</a:t>
             </a:fld>
             <a:endParaRPr lang="pt-BR"/>
           </a:p>
@@ -863,7 +863,7 @@
           <a:p>
             <a:fld id="{A6855F6E-E23F-4401-B6B0-C27E3B10C9A1}" type="datetimeFigureOut">
               <a:rPr lang="pt-BR" smtClean="0"/>
-              <a:t>21/04/2022</a:t>
+              <a:t>23/04/2022</a:t>
             </a:fld>
             <a:endParaRPr lang="pt-BR"/>
           </a:p>
@@ -917,7 +917,7 @@
           <a:p>
             <a:fld id="{64C426D7-35A4-4F90-89F2-190644AC5077}" type="slidenum">
               <a:rPr lang="pt-BR" smtClean="0"/>
-              <a:t>‹#›</a:t>
+              <a:t>‹nº›</a:t>
             </a:fld>
             <a:endParaRPr lang="pt-BR"/>
           </a:p>
@@ -1138,7 +1138,7 @@
           <a:p>
             <a:fld id="{A6855F6E-E23F-4401-B6B0-C27E3B10C9A1}" type="datetimeFigureOut">
               <a:rPr lang="pt-BR" smtClean="0"/>
-              <a:t>21/04/2022</a:t>
+              <a:t>23/04/2022</a:t>
             </a:fld>
             <a:endParaRPr lang="pt-BR"/>
           </a:p>
@@ -1192,7 +1192,7 @@
           <a:p>
             <a:fld id="{64C426D7-35A4-4F90-89F2-190644AC5077}" type="slidenum">
               <a:rPr lang="pt-BR" smtClean="0"/>
-              <a:t>‹#›</a:t>
+              <a:t>‹nº›</a:t>
             </a:fld>
             <a:endParaRPr lang="pt-BR"/>
           </a:p>
@@ -1403,7 +1403,7 @@
           <a:p>
             <a:fld id="{A6855F6E-E23F-4401-B6B0-C27E3B10C9A1}" type="datetimeFigureOut">
               <a:rPr lang="pt-BR" smtClean="0"/>
-              <a:t>21/04/2022</a:t>
+              <a:t>23/04/2022</a:t>
             </a:fld>
             <a:endParaRPr lang="pt-BR"/>
           </a:p>
@@ -1457,7 +1457,7 @@
           <a:p>
             <a:fld id="{64C426D7-35A4-4F90-89F2-190644AC5077}" type="slidenum">
               <a:rPr lang="pt-BR" smtClean="0"/>
-              <a:t>‹#›</a:t>
+              <a:t>‹nº›</a:t>
             </a:fld>
             <a:endParaRPr lang="pt-BR"/>
           </a:p>
@@ -1815,7 +1815,7 @@
           <a:p>
             <a:fld id="{A6855F6E-E23F-4401-B6B0-C27E3B10C9A1}" type="datetimeFigureOut">
               <a:rPr lang="pt-BR" smtClean="0"/>
-              <a:t>21/04/2022</a:t>
+              <a:t>23/04/2022</a:t>
             </a:fld>
             <a:endParaRPr lang="pt-BR"/>
           </a:p>
@@ -1869,7 +1869,7 @@
           <a:p>
             <a:fld id="{64C426D7-35A4-4F90-89F2-190644AC5077}" type="slidenum">
               <a:rPr lang="pt-BR" smtClean="0"/>
-              <a:t>‹#›</a:t>
+              <a:t>‹nº›</a:t>
             </a:fld>
             <a:endParaRPr lang="pt-BR"/>
           </a:p>
@@ -1956,7 +1956,7 @@
           <a:p>
             <a:fld id="{A6855F6E-E23F-4401-B6B0-C27E3B10C9A1}" type="datetimeFigureOut">
               <a:rPr lang="pt-BR" smtClean="0"/>
-              <a:t>21/04/2022</a:t>
+              <a:t>23/04/2022</a:t>
             </a:fld>
             <a:endParaRPr lang="pt-BR"/>
           </a:p>
@@ -2010,7 +2010,7 @@
           <a:p>
             <a:fld id="{64C426D7-35A4-4F90-89F2-190644AC5077}" type="slidenum">
               <a:rPr lang="pt-BR" smtClean="0"/>
-              <a:t>‹#›</a:t>
+              <a:t>‹nº›</a:t>
             </a:fld>
             <a:endParaRPr lang="pt-BR"/>
           </a:p>
@@ -2069,7 +2069,7 @@
           <a:p>
             <a:fld id="{A6855F6E-E23F-4401-B6B0-C27E3B10C9A1}" type="datetimeFigureOut">
               <a:rPr lang="pt-BR" smtClean="0"/>
-              <a:t>21/04/2022</a:t>
+              <a:t>23/04/2022</a:t>
             </a:fld>
             <a:endParaRPr lang="pt-BR"/>
           </a:p>
@@ -2123,7 +2123,7 @@
           <a:p>
             <a:fld id="{64C426D7-35A4-4F90-89F2-190644AC5077}" type="slidenum">
               <a:rPr lang="pt-BR" smtClean="0"/>
-              <a:t>‹#›</a:t>
+              <a:t>‹nº›</a:t>
             </a:fld>
             <a:endParaRPr lang="pt-BR"/>
           </a:p>
@@ -2380,7 +2380,7 @@
           <a:p>
             <a:fld id="{A6855F6E-E23F-4401-B6B0-C27E3B10C9A1}" type="datetimeFigureOut">
               <a:rPr lang="pt-BR" smtClean="0"/>
-              <a:t>21/04/2022</a:t>
+              <a:t>23/04/2022</a:t>
             </a:fld>
             <a:endParaRPr lang="pt-BR"/>
           </a:p>
@@ -2434,7 +2434,7 @@
           <a:p>
             <a:fld id="{64C426D7-35A4-4F90-89F2-190644AC5077}" type="slidenum">
               <a:rPr lang="pt-BR" smtClean="0"/>
-              <a:t>‹#›</a:t>
+              <a:t>‹nº›</a:t>
             </a:fld>
             <a:endParaRPr lang="pt-BR"/>
           </a:p>
@@ -2668,7 +2668,7 @@
           <a:p>
             <a:fld id="{A6855F6E-E23F-4401-B6B0-C27E3B10C9A1}" type="datetimeFigureOut">
               <a:rPr lang="pt-BR" smtClean="0"/>
-              <a:t>21/04/2022</a:t>
+              <a:t>23/04/2022</a:t>
             </a:fld>
             <a:endParaRPr lang="pt-BR"/>
           </a:p>
@@ -2722,7 +2722,7 @@
           <a:p>
             <a:fld id="{64C426D7-35A4-4F90-89F2-190644AC5077}" type="slidenum">
               <a:rPr lang="pt-BR" smtClean="0"/>
-              <a:t>‹#›</a:t>
+              <a:t>‹nº›</a:t>
             </a:fld>
             <a:endParaRPr lang="pt-BR"/>
           </a:p>
@@ -2909,7 +2909,7 @@
           <a:p>
             <a:fld id="{A6855F6E-E23F-4401-B6B0-C27E3B10C9A1}" type="datetimeFigureOut">
               <a:rPr lang="pt-BR" smtClean="0"/>
-              <a:t>21/04/2022</a:t>
+              <a:t>23/04/2022</a:t>
             </a:fld>
             <a:endParaRPr lang="pt-BR"/>
           </a:p>
@@ -2999,7 +2999,7 @@
           <a:p>
             <a:fld id="{64C426D7-35A4-4F90-89F2-190644AC5077}" type="slidenum">
               <a:rPr lang="pt-BR" smtClean="0"/>
-              <a:t>‹#›</a:t>
+              <a:t>‹nº›</a:t>
             </a:fld>
             <a:endParaRPr lang="pt-BR"/>
           </a:p>
@@ -4151,6 +4151,168 @@
           </a:p>
         </p:txBody>
       </p:sp>
+      <p:sp>
+        <p:nvSpPr>
+          <p:cNvPr id="14" name="Retângulo 13">
+            <a:extLst>
+              <a:ext uri="{FF2B5EF4-FFF2-40B4-BE49-F238E27FC236}">
+                <a16:creationId xmlns:a16="http://schemas.microsoft.com/office/drawing/2014/main" id="{EC68912E-1200-4E57-932A-A1222BC5F88C}"/>
+              </a:ext>
+            </a:extLst>
+          </p:cNvPr>
+          <p:cNvSpPr/>
+          <p:nvPr/>
+        </p:nvSpPr>
+        <p:spPr>
+          <a:xfrm>
+            <a:off x="9567016" y="4040024"/>
+            <a:ext cx="2050991" cy="1948442"/>
+          </a:xfrm>
+          <a:prstGeom prst="rect">
+            <a:avLst/>
+          </a:prstGeom>
+          <a:solidFill>
+            <a:schemeClr val="bg1">
+              <a:lumMod val="75000"/>
+            </a:schemeClr>
+          </a:solidFill>
+          <a:ln>
+            <a:solidFill>
+              <a:schemeClr val="tx1"/>
+            </a:solidFill>
+            <a:prstDash val="dash"/>
+          </a:ln>
+        </p:spPr>
+        <p:style>
+          <a:lnRef idx="2">
+            <a:schemeClr val="accent1">
+              <a:shade val="50000"/>
+            </a:schemeClr>
+          </a:lnRef>
+          <a:fillRef idx="1">
+            <a:schemeClr val="accent1"/>
+          </a:fillRef>
+          <a:effectRef idx="0">
+            <a:schemeClr val="accent1"/>
+          </a:effectRef>
+          <a:fontRef idx="minor">
+            <a:schemeClr val="lt1"/>
+          </a:fontRef>
+        </p:style>
+        <p:txBody>
+          <a:bodyPr rtlCol="0" anchor="ctr"/>
+          <a:lstStyle/>
+          <a:p>
+            <a:pPr algn="ctr"/>
+            <a:r>
+              <a:rPr lang="pt-BR" b="1" dirty="0">
+                <a:solidFill>
+                  <a:schemeClr val="tx1"/>
+                </a:solidFill>
+              </a:rPr>
+              <a:t>Geolocalização</a:t>
+            </a:r>
+          </a:p>
+          <a:p>
+            <a:pPr algn="ctr"/>
+            <a:r>
+              <a:rPr lang="pt-BR" sz="1200" dirty="0">
+                <a:solidFill>
+                  <a:schemeClr val="tx1"/>
+                </a:solidFill>
+              </a:rPr>
+              <a:t>[Container: </a:t>
+            </a:r>
+            <a:r>
+              <a:rPr lang="pt-BR" sz="1200" b="0" i="0" dirty="0">
+                <a:solidFill>
+                  <a:schemeClr val="tx1"/>
+                </a:solidFill>
+                <a:effectLst/>
+                <a:latin typeface="Whitney"/>
+              </a:rPr>
+              <a:t>Google Geolocation API</a:t>
+            </a:r>
+            <a:r>
+              <a:rPr lang="pt-BR" sz="1200" dirty="0">
+                <a:solidFill>
+                  <a:schemeClr val="tx1"/>
+                </a:solidFill>
+              </a:rPr>
+              <a:t>]</a:t>
+            </a:r>
+          </a:p>
+          <a:p>
+            <a:pPr algn="ctr"/>
+            <a:endParaRPr lang="pt-BR" sz="1200" dirty="0">
+              <a:solidFill>
+                <a:schemeClr val="tx1"/>
+              </a:solidFill>
+            </a:endParaRPr>
+          </a:p>
+          <a:p>
+            <a:pPr algn="ctr"/>
+            <a:r>
+              <a:rPr lang="pt-BR" sz="1200" dirty="0">
+                <a:solidFill>
+                  <a:schemeClr val="tx1"/>
+                </a:solidFill>
+              </a:rPr>
+              <a:t>API para localizar as ONGs próximas ao usuário doador</a:t>
+            </a:r>
+          </a:p>
+        </p:txBody>
+      </p:sp>
+      <p:cxnSp>
+        <p:nvCxnSpPr>
+          <p:cNvPr id="18" name="Conector: Angulado 17">
+            <a:extLst>
+              <a:ext uri="{FF2B5EF4-FFF2-40B4-BE49-F238E27FC236}">
+                <a16:creationId xmlns:a16="http://schemas.microsoft.com/office/drawing/2014/main" id="{6A935E46-C344-43E2-8FAA-6BDB32BED007}"/>
+              </a:ext>
+            </a:extLst>
+          </p:cNvPr>
+          <p:cNvCxnSpPr>
+            <a:cxnSpLocks/>
+            <a:stCxn id="6" idx="2"/>
+            <a:endCxn id="14" idx="1"/>
+          </p:cNvCxnSpPr>
+          <p:nvPr/>
+        </p:nvCxnSpPr>
+        <p:spPr>
+          <a:xfrm rot="16200000" flipH="1">
+            <a:off x="7581901" y="3029130"/>
+            <a:ext cx="2168494" cy="1801736"/>
+          </a:xfrm>
+          <a:prstGeom prst="bentConnector2">
+            <a:avLst/>
+          </a:prstGeom>
+          <a:ln w="38100">
+            <a:solidFill>
+              <a:schemeClr val="tx1">
+                <a:lumMod val="50000"/>
+                <a:lumOff val="50000"/>
+              </a:schemeClr>
+            </a:solidFill>
+            <a:prstDash val="sysDash"/>
+            <a:tailEnd type="triangle"/>
+          </a:ln>
+        </p:spPr>
+        <p:style>
+          <a:lnRef idx="1">
+            <a:schemeClr val="accent1"/>
+          </a:lnRef>
+          <a:fillRef idx="0">
+            <a:schemeClr val="accent1"/>
+          </a:fillRef>
+          <a:effectRef idx="0">
+            <a:schemeClr val="accent1"/>
+          </a:effectRef>
+          <a:fontRef idx="minor">
+            <a:schemeClr val="tx1"/>
+          </a:fontRef>
+        </p:style>
+      </p:cxnSp>
     </p:spTree>
     <p:extLst>
       <p:ext uri="{BB962C8B-B14F-4D97-AF65-F5344CB8AC3E}">

</xml_diff>